<commit_message>
Modif PPT + Pic
</commit_message>
<xml_diff>
--- a/Bluetooth sur Android.pptx
+++ b/Bluetooth sur Android.pptx
@@ -126,7 +126,7 @@
   </p:defaultTextStyle>
   <p:extLst>
     <p:ext uri="{EFAFB233-063F-42B5-8137-9DF3F51BA10A}">
-      <p15:sldGuideLst xmlns:p15="http://schemas.microsoft.com/office/powerpoint/2012/main" xmlns=""/>
+      <p15:sldGuideLst xmlns="" xmlns:p15="http://schemas.microsoft.com/office/powerpoint/2012/main"/>
     </p:ext>
   </p:extLst>
 </p:presentation>
@@ -214,7 +214,7 @@
           <a:p>
             <a:fld id="{CE289607-0A54-408C-A42F-BCBE04BD5BC2}" type="datetimeFigureOut">
               <a:rPr lang="fr-CH" smtClean="0"/>
-              <a:t>14.01.2014</a:t>
+              <a:t>20.01.2014</a:t>
             </a:fld>
             <a:endParaRPr lang="fr-CH"/>
           </a:p>
@@ -2100,7 +2100,7 @@
           <a:p>
             <a:fld id="{EF322ED6-D996-46B6-8671-9C1BD3EF61D0}" type="datetime1">
               <a:rPr lang="fr-CH" smtClean="0"/>
-              <a:t>14.01.2014</a:t>
+              <a:t>20.01.2014</a:t>
             </a:fld>
             <a:endParaRPr lang="en-US" dirty="0"/>
           </a:p>
@@ -2396,7 +2396,7 @@
           <a:p>
             <a:fld id="{81216877-43B9-4594-9E35-CB10C32F44E1}" type="datetime1">
               <a:rPr lang="fr-CH" smtClean="0"/>
-              <a:t>14.01.2014</a:t>
+              <a:t>20.01.2014</a:t>
             </a:fld>
             <a:endParaRPr lang="en-US" dirty="0"/>
           </a:p>
@@ -2644,7 +2644,7 @@
           <a:p>
             <a:fld id="{02DB53A1-36A0-443A-A1F6-237BF4F36FAF}" type="datetime1">
               <a:rPr lang="fr-CH" smtClean="0"/>
-              <a:t>14.01.2014</a:t>
+              <a:t>20.01.2014</a:t>
             </a:fld>
             <a:endParaRPr lang="en-US" dirty="0"/>
           </a:p>
@@ -3184,7 +3184,7 @@
           <a:p>
             <a:fld id="{F9FD1EF0-91D3-4688-A11D-16ECCB554544}" type="datetime1">
               <a:rPr lang="fr-CH" smtClean="0"/>
-              <a:t>14.01.2014</a:t>
+              <a:t>20.01.2014</a:t>
             </a:fld>
             <a:endParaRPr lang="en-US" dirty="0"/>
           </a:p>
@@ -3432,7 +3432,7 @@
           <a:p>
             <a:fld id="{1CCE17D6-1995-4269-ABC1-A99B13FC3A10}" type="datetime1">
               <a:rPr lang="fr-CH" smtClean="0"/>
-              <a:t>14.01.2014</a:t>
+              <a:t>20.01.2014</a:t>
             </a:fld>
             <a:endParaRPr lang="en-US" dirty="0"/>
           </a:p>
@@ -3964,7 +3964,7 @@
           <a:p>
             <a:fld id="{61A1747E-89CE-4C9C-A550-73867AEE447D}" type="datetime1">
               <a:rPr lang="fr-CH" smtClean="0"/>
-              <a:t>14.01.2014</a:t>
+              <a:t>20.01.2014</a:t>
             </a:fld>
             <a:endParaRPr lang="en-US" dirty="0"/>
           </a:p>
@@ -4261,7 +4261,7 @@
           <a:p>
             <a:fld id="{BF5A5DCD-5FEB-4197-879B-CF46CF83DEF2}" type="datetime1">
               <a:rPr lang="fr-CH" smtClean="0"/>
-              <a:t>14.01.2014</a:t>
+              <a:t>20.01.2014</a:t>
             </a:fld>
             <a:endParaRPr lang="en-US" dirty="0"/>
           </a:p>
@@ -4435,7 +4435,7 @@
           <a:p>
             <a:fld id="{09855FBF-16E6-407A-88C7-FCF48B8525BB}" type="datetime1">
               <a:rPr lang="fr-CH" smtClean="0"/>
-              <a:t>14.01.2014</a:t>
+              <a:t>20.01.2014</a:t>
             </a:fld>
             <a:endParaRPr lang="en-US" dirty="0"/>
           </a:p>
@@ -4615,7 +4615,7 @@
           <a:p>
             <a:fld id="{A61D9C73-689D-4C6C-8F20-D7F3B1EA77C9}" type="datetime1">
               <a:rPr lang="fr-CH" smtClean="0"/>
-              <a:t>14.01.2014</a:t>
+              <a:t>20.01.2014</a:t>
             </a:fld>
             <a:endParaRPr lang="en-US" dirty="0"/>
           </a:p>
@@ -4785,7 +4785,7 @@
           <a:p>
             <a:fld id="{682AD09F-3180-436E-816E-79AE2F329F10}" type="datetime1">
               <a:rPr lang="fr-CH" smtClean="0"/>
-              <a:t>14.01.2014</a:t>
+              <a:t>20.01.2014</a:t>
             </a:fld>
             <a:endParaRPr lang="en-US" dirty="0"/>
           </a:p>
@@ -5036,7 +5036,7 @@
           <a:p>
             <a:fld id="{8921CAEA-5DF8-4184-8579-722B016BA5B3}" type="datetime1">
               <a:rPr lang="fr-CH" smtClean="0"/>
-              <a:t>14.01.2014</a:t>
+              <a:t>20.01.2014</a:t>
             </a:fld>
             <a:endParaRPr lang="en-US" dirty="0"/>
           </a:p>
@@ -5333,7 +5333,7 @@
           <a:p>
             <a:fld id="{31E5F645-E207-4A07-9BF6-DEE2B12497E1}" type="datetime1">
               <a:rPr lang="fr-CH" smtClean="0"/>
-              <a:t>14.01.2014</a:t>
+              <a:t>20.01.2014</a:t>
             </a:fld>
             <a:endParaRPr lang="en-US" dirty="0"/>
           </a:p>
@@ -5775,7 +5775,7 @@
           <a:p>
             <a:fld id="{327BAF23-CF1D-4B87-9DE6-CEA838016C63}" type="datetime1">
               <a:rPr lang="fr-CH" smtClean="0"/>
-              <a:t>14.01.2014</a:t>
+              <a:t>20.01.2014</a:t>
             </a:fld>
             <a:endParaRPr lang="en-US" dirty="0"/>
           </a:p>
@@ -5893,7 +5893,7 @@
           <a:p>
             <a:fld id="{05097574-F054-46A1-8CEE-61B313CA8A4F}" type="datetime1">
               <a:rPr lang="fr-CH" smtClean="0"/>
-              <a:t>14.01.2014</a:t>
+              <a:t>20.01.2014</a:t>
             </a:fld>
             <a:endParaRPr lang="en-US" dirty="0"/>
           </a:p>
@@ -5988,7 +5988,7 @@
           <a:p>
             <a:fld id="{DF67AD39-77B6-4C9F-8465-A256F9433F94}" type="datetime1">
               <a:rPr lang="fr-CH" smtClean="0"/>
-              <a:t>14.01.2014</a:t>
+              <a:t>20.01.2014</a:t>
             </a:fld>
             <a:endParaRPr lang="en-US" dirty="0"/>
           </a:p>
@@ -6271,7 +6271,7 @@
           <a:p>
             <a:fld id="{30B2F984-B698-4924-AE20-D5DA2C47FF2F}" type="datetime1">
               <a:rPr lang="fr-CH" smtClean="0"/>
-              <a:t>14.01.2014</a:t>
+              <a:t>20.01.2014</a:t>
             </a:fld>
             <a:endParaRPr lang="en-US" dirty="0"/>
           </a:p>
@@ -6562,7 +6562,7 @@
           <a:p>
             <a:fld id="{9188D330-D561-4067-97B5-29C2D033D9F0}" type="datetime1">
               <a:rPr lang="fr-CH" smtClean="0"/>
-              <a:t>14.01.2014</a:t>
+              <a:t>20.01.2014</a:t>
             </a:fld>
             <a:endParaRPr lang="en-US" dirty="0"/>
           </a:p>
@@ -7092,7 +7092,7 @@
           <a:p>
             <a:fld id="{4DA9AAA7-BB5C-4E7B-9942-35D321C854D7}" type="datetime1">
               <a:rPr lang="fr-CH" smtClean="0"/>
-              <a:t>14.01.2014</a:t>
+              <a:t>20.01.2014</a:t>
             </a:fld>
             <a:endParaRPr lang="en-US" dirty="0"/>
           </a:p>
@@ -7688,11 +7688,7 @@
           <a:p>
             <a:r>
               <a:rPr lang="fr-CH" i="1" dirty="0" smtClean="0"/>
-              <a:t> par MUELLER Michael et SAVY </a:t>
-            </a:r>
-            <a:r>
-              <a:rPr lang="fr-CH" i="1" dirty="0" smtClean="0"/>
-              <a:t>Cyrille</a:t>
+              <a:t> par MUELLER Michael et SAVY Cyrille</a:t>
             </a:r>
           </a:p>
           <a:p>
@@ -7710,7 +7706,6 @@
               <a:rPr lang="fr-CH" i="1" dirty="0" smtClean="0"/>
               <a:t>Nuria, Rizzotti Aïcha</a:t>
             </a:r>
-            <a:endParaRPr lang="fr-CH" i="1" dirty="0" smtClean="0"/>
           </a:p>
           <a:p>
             <a:r>
@@ -7803,7 +7798,7 @@
           <a:p>
             <a:fld id="{31E5F645-E207-4A07-9BF6-DEE2B12497E1}" type="datetime1">
               <a:rPr lang="fr-CH" smtClean="0"/>
-              <a:t>14.01.2014</a:t>
+              <a:t>20.01.2014</a:t>
             </a:fld>
             <a:endParaRPr lang="en-US" dirty="0"/>
           </a:p>
@@ -8352,7 +8347,7 @@
           <a:p>
             <a:fld id="{682AD09F-3180-436E-816E-79AE2F329F10}" type="datetime1">
               <a:rPr lang="fr-CH" smtClean="0"/>
-              <a:t>14.01.2014</a:t>
+              <a:t>20.01.2014</a:t>
             </a:fld>
             <a:endParaRPr lang="en-US" dirty="0"/>
           </a:p>
@@ -8523,7 +8518,7 @@
           <a:p>
             <a:fld id="{30B2F984-B698-4924-AE20-D5DA2C47FF2F}" type="datetime1">
               <a:rPr lang="fr-CH" smtClean="0"/>
-              <a:t>14.01.2014</a:t>
+              <a:t>20.01.2014</a:t>
             </a:fld>
             <a:endParaRPr lang="en-US" dirty="0"/>
           </a:p>
@@ -8677,8 +8672,8 @@
         </p:nvSpPr>
         <p:spPr>
           <a:xfrm>
-            <a:off x="8485651" y="1132764"/>
-            <a:ext cx="1282889" cy="713656"/>
+            <a:off x="8477714" y="1132764"/>
+            <a:ext cx="1275887" cy="713656"/>
           </a:xfrm>
           <a:prstGeom prst="rect">
             <a:avLst/>
@@ -8817,7 +8812,7 @@
           <a:p>
             <a:fld id="{30B2F984-B698-4924-AE20-D5DA2C47FF2F}" type="datetime1">
               <a:rPr lang="fr-CH" smtClean="0"/>
-              <a:t>14.01.2014</a:t>
+              <a:t>20.01.2014</a:t>
             </a:fld>
             <a:endParaRPr lang="en-US" dirty="0"/>
           </a:p>
@@ -8872,7 +8867,7 @@
       </p:sp>
       <p:pic>
         <p:nvPicPr>
-          <p:cNvPr id="2050" name="Picture 2"/>
+          <p:cNvPr id="1026" name="Picture 2"/>
           <p:cNvPicPr>
             <a:picLocks noChangeAspect="1" noChangeArrowheads="1"/>
           </p:cNvPicPr>
@@ -8893,8 +8888,8 @@
         </p:blipFill>
         <p:spPr bwMode="auto">
           <a:xfrm>
-            <a:off x="6641090" y="423016"/>
-            <a:ext cx="3458874" cy="5288020"/>
+            <a:off x="5834063" y="244247"/>
+            <a:ext cx="3756257" cy="5742668"/>
           </a:xfrm>
           <a:prstGeom prst="rect">
             <a:avLst/>
@@ -8990,25 +8985,6 @@
       </p:sp>
       <p:sp>
         <p:nvSpPr>
-          <p:cNvPr id="3" name="Espace réservé du texte 2"/>
-          <p:cNvSpPr>
-            <a:spLocks noGrp="1"/>
-          </p:cNvSpPr>
-          <p:nvPr>
-            <p:ph type="body" idx="1"/>
-          </p:nvPr>
-        </p:nvSpPr>
-        <p:spPr/>
-        <p:txBody>
-          <a:bodyPr/>
-          <a:lstStyle/>
-          <a:p>
-            <a:endParaRPr lang="fr-CH"/>
-          </a:p>
-        </p:txBody>
-      </p:sp>
-      <p:sp>
-        <p:nvSpPr>
           <p:cNvPr id="4" name="Espace réservé de la date 3"/>
           <p:cNvSpPr>
             <a:spLocks noGrp="1"/>
@@ -9024,7 +9000,7 @@
           <a:p>
             <a:fld id="{8921CAEA-5DF8-4184-8579-722B016BA5B3}" type="datetime1">
               <a:rPr lang="fr-CH" smtClean="0"/>
-              <a:t>14.01.2014</a:t>
+              <a:t>20.01.2014</a:t>
             </a:fld>
             <a:endParaRPr lang="en-US" dirty="0"/>
           </a:p>
@@ -9286,7 +9262,7 @@
           <a:p>
             <a:fld id="{31E5F645-E207-4A07-9BF6-DEE2B12497E1}" type="datetime1">
               <a:rPr lang="fr-CH" smtClean="0"/>
-              <a:t>14.01.2014</a:t>
+              <a:t>20.01.2014</a:t>
             </a:fld>
             <a:endParaRPr lang="en-US" dirty="0"/>
           </a:p>
@@ -9416,7 +9392,7 @@
           <a:p>
             <a:fld id="{31E5F645-E207-4A07-9BF6-DEE2B12497E1}" type="datetime1">
               <a:rPr lang="fr-CH" smtClean="0"/>
-              <a:t>14.01.2014</a:t>
+              <a:t>20.01.2014</a:t>
             </a:fld>
             <a:endParaRPr lang="en-US" dirty="0"/>
           </a:p>
@@ -9678,7 +9654,7 @@
           <a:p>
             <a:fld id="{8921CAEA-5DF8-4184-8579-722B016BA5B3}" type="datetime1">
               <a:rPr lang="fr-CH" smtClean="0"/>
-              <a:t>14.01.2014</a:t>
+              <a:t>20.01.2014</a:t>
             </a:fld>
             <a:endParaRPr lang="en-US" dirty="0"/>
           </a:p>
@@ -9828,7 +9804,7 @@
           <a:p>
             <a:fld id="{81216877-43B9-4594-9E35-CB10C32F44E1}" type="datetime1">
               <a:rPr lang="fr-CH" smtClean="0"/>
-              <a:t>14.01.2014</a:t>
+              <a:t>20.01.2014</a:t>
             </a:fld>
             <a:endParaRPr lang="en-US" dirty="0"/>
           </a:p>
@@ -9992,7 +9968,7 @@
           <a:p>
             <a:fld id="{CDC80C61-9D62-4947-B197-758B4125D101}" type="datetime1">
               <a:rPr lang="fr-CH" smtClean="0"/>
-              <a:t>14.01.2014</a:t>
+              <a:t>20.01.2014</a:t>
             </a:fld>
             <a:endParaRPr lang="en-US" dirty="0"/>
           </a:p>
@@ -10141,7 +10117,7 @@
           <a:p>
             <a:fld id="{8921CAEA-5DF8-4184-8579-722B016BA5B3}" type="datetime1">
               <a:rPr lang="fr-CH" smtClean="0"/>
-              <a:t>14.01.2014</a:t>
+              <a:t>20.01.2014</a:t>
             </a:fld>
             <a:endParaRPr lang="en-US" dirty="0"/>
           </a:p>
@@ -10299,7 +10275,7 @@
           <a:p>
             <a:fld id="{37FB751D-0FC8-4C1C-95A9-8D98738875A3}" type="datetime1">
               <a:rPr lang="fr-CH" smtClean="0"/>
-              <a:t>14.01.2014</a:t>
+              <a:t>20.01.2014</a:t>
             </a:fld>
             <a:endParaRPr lang="en-US" dirty="0"/>
           </a:p>
@@ -10429,7 +10405,7 @@
           <a:p>
             <a:fld id="{A765A8E5-B07D-4AA9-BB96-BEFA278EA489}" type="datetime1">
               <a:rPr lang="fr-CH" smtClean="0"/>
-              <a:t>14.01.2014</a:t>
+              <a:t>20.01.2014</a:t>
             </a:fld>
             <a:endParaRPr lang="en-US" dirty="0"/>
           </a:p>
@@ -10583,8 +10559,8 @@
         </p:blipFill>
         <p:spPr bwMode="auto">
           <a:xfrm>
-            <a:off x="8002992" y="2547937"/>
-            <a:ext cx="1567757" cy="2728913"/>
+            <a:off x="8002993" y="2547937"/>
+            <a:ext cx="1551340" cy="2717007"/>
           </a:xfrm>
           <a:prstGeom prst="rect">
             <a:avLst/>
@@ -10624,6 +10600,144 @@
           </a:extLst>
         </p:spPr>
       </p:pic>
+      <p:cxnSp>
+        <p:nvCxnSpPr>
+          <p:cNvPr id="4" name="Connecteur droit avec flèche 3"/>
+          <p:cNvCxnSpPr/>
+          <p:nvPr/>
+        </p:nvCxnSpPr>
+        <p:spPr>
+          <a:xfrm>
+            <a:off x="5602514" y="3383926"/>
+            <a:ext cx="1828800" cy="0"/>
+          </a:xfrm>
+          <a:prstGeom prst="straightConnector1">
+            <a:avLst/>
+          </a:prstGeom>
+          <a:ln w="73025">
+            <a:solidFill>
+              <a:schemeClr val="tx1"/>
+            </a:solidFill>
+            <a:headEnd type="arrow"/>
+            <a:tailEnd type="none"/>
+          </a:ln>
+        </p:spPr>
+        <p:style>
+          <a:lnRef idx="1">
+            <a:schemeClr val="accent1"/>
+          </a:lnRef>
+          <a:fillRef idx="0">
+            <a:schemeClr val="accent1"/>
+          </a:fillRef>
+          <a:effectRef idx="0">
+            <a:schemeClr val="accent1"/>
+          </a:effectRef>
+          <a:fontRef idx="minor">
+            <a:schemeClr val="tx1"/>
+          </a:fontRef>
+        </p:style>
+      </p:cxnSp>
+      <p:cxnSp>
+        <p:nvCxnSpPr>
+          <p:cNvPr id="11" name="Connecteur droit avec flèche 10"/>
+          <p:cNvCxnSpPr/>
+          <p:nvPr/>
+        </p:nvCxnSpPr>
+        <p:spPr>
+          <a:xfrm flipH="1">
+            <a:off x="5746482" y="4378155"/>
+            <a:ext cx="1786432" cy="0"/>
+          </a:xfrm>
+          <a:prstGeom prst="straightConnector1">
+            <a:avLst/>
+          </a:prstGeom>
+          <a:ln w="73025">
+            <a:solidFill>
+              <a:schemeClr val="tx1"/>
+            </a:solidFill>
+            <a:headEnd type="arrow"/>
+            <a:tailEnd type="none"/>
+          </a:ln>
+        </p:spPr>
+        <p:style>
+          <a:lnRef idx="1">
+            <a:schemeClr val="accent1"/>
+          </a:lnRef>
+          <a:fillRef idx="0">
+            <a:schemeClr val="accent1"/>
+          </a:fillRef>
+          <a:effectRef idx="0">
+            <a:schemeClr val="accent1"/>
+          </a:effectRef>
+          <a:fontRef idx="minor">
+            <a:schemeClr val="tx1"/>
+          </a:fontRef>
+        </p:style>
+      </p:cxnSp>
+      <p:sp>
+        <p:nvSpPr>
+          <p:cNvPr id="13" name="ZoneTexte 12"/>
+          <p:cNvSpPr txBox="1"/>
+          <p:nvPr/>
+        </p:nvSpPr>
+        <p:spPr>
+          <a:xfrm>
+            <a:off x="5884367" y="2824884"/>
+            <a:ext cx="1510661" cy="369332"/>
+          </a:xfrm>
+          <a:prstGeom prst="rect">
+            <a:avLst/>
+          </a:prstGeom>
+          <a:noFill/>
+        </p:spPr>
+        <p:txBody>
+          <a:bodyPr wrap="square" rtlCol="0">
+            <a:spAutoFit/>
+          </a:bodyPr>
+          <a:lstStyle/>
+          <a:p>
+            <a:r>
+              <a:rPr lang="fr-CH" dirty="0" err="1" smtClean="0"/>
+              <a:t>LEDs</a:t>
+            </a:r>
+            <a:r>
+              <a:rPr lang="fr-CH" dirty="0" smtClean="0"/>
+              <a:t> + LCD</a:t>
+            </a:r>
+            <a:endParaRPr lang="fr-CH" dirty="0"/>
+          </a:p>
+        </p:txBody>
+      </p:sp>
+      <p:sp>
+        <p:nvSpPr>
+          <p:cNvPr id="16" name="ZoneTexte 15"/>
+          <p:cNvSpPr txBox="1"/>
+          <p:nvPr/>
+        </p:nvSpPr>
+        <p:spPr>
+          <a:xfrm>
+            <a:off x="5746482" y="3906440"/>
+            <a:ext cx="1510661" cy="369332"/>
+          </a:xfrm>
+          <a:prstGeom prst="rect">
+            <a:avLst/>
+          </a:prstGeom>
+          <a:noFill/>
+        </p:spPr>
+        <p:txBody>
+          <a:bodyPr wrap="square" rtlCol="0">
+            <a:spAutoFit/>
+          </a:bodyPr>
+          <a:lstStyle/>
+          <a:p>
+            <a:r>
+              <a:rPr lang="fr-CH" dirty="0" smtClean="0"/>
+              <a:t>Pot + Boutons</a:t>
+            </a:r>
+            <a:endParaRPr lang="fr-CH" dirty="0"/>
+          </a:p>
+        </p:txBody>
+      </p:sp>
     </p:spTree>
     <p:extLst>
       <p:ext uri="{BB962C8B-B14F-4D97-AF65-F5344CB8AC3E}">
@@ -10701,7 +10815,11 @@
           <a:p>
             <a:r>
               <a:rPr lang="fr-CH" dirty="0" smtClean="0"/>
-              <a:t>Paramétrage de machines</a:t>
+              <a:t>Paramétrage </a:t>
+            </a:r>
+            <a:r>
+              <a:rPr lang="fr-CH" dirty="0" smtClean="0"/>
+              <a:t>de machines</a:t>
             </a:r>
           </a:p>
           <a:p>
@@ -10713,15 +10831,19 @@
           <a:p>
             <a:r>
               <a:rPr lang="fr-CH" dirty="0" smtClean="0"/>
-              <a:t>Contrôle d’un robot</a:t>
-            </a:r>
-          </a:p>
-          <a:p>
+              <a:t>Contrôle d’un </a:t>
+            </a:r>
             <a:r>
               <a:rPr lang="fr-CH" dirty="0" smtClean="0"/>
-              <a:t>…</a:t>
-            </a:r>
-            <a:endParaRPr lang="fr-CH" dirty="0"/>
+              <a:t>robot</a:t>
+            </a:r>
+          </a:p>
+          <a:p>
+            <a:r>
+              <a:rPr lang="fr-CH" dirty="0" smtClean="0"/>
+              <a:t>Station météo</a:t>
+            </a:r>
+            <a:endParaRPr lang="fr-CH" dirty="0" smtClean="0"/>
           </a:p>
         </p:txBody>
       </p:sp>
@@ -10742,7 +10864,7 @@
           <a:p>
             <a:fld id="{682AD09F-3180-436E-816E-79AE2F329F10}" type="datetime1">
               <a:rPr lang="fr-CH" smtClean="0"/>
-              <a:t>14.01.2014</a:t>
+              <a:t>20.01.2014</a:t>
             </a:fld>
             <a:endParaRPr lang="en-US" dirty="0"/>
           </a:p>
@@ -10857,25 +10979,6 @@
       </p:sp>
       <p:sp>
         <p:nvSpPr>
-          <p:cNvPr id="3" name="Espace réservé du texte 2"/>
-          <p:cNvSpPr>
-            <a:spLocks noGrp="1"/>
-          </p:cNvSpPr>
-          <p:nvPr>
-            <p:ph type="body" idx="1"/>
-          </p:nvPr>
-        </p:nvSpPr>
-        <p:spPr/>
-        <p:txBody>
-          <a:bodyPr/>
-          <a:lstStyle/>
-          <a:p>
-            <a:endParaRPr lang="fr-CH"/>
-          </a:p>
-        </p:txBody>
-      </p:sp>
-      <p:sp>
-        <p:nvSpPr>
           <p:cNvPr id="4" name="Espace réservé de la date 3"/>
           <p:cNvSpPr>
             <a:spLocks noGrp="1"/>
@@ -10891,7 +10994,7 @@
           <a:p>
             <a:fld id="{8921CAEA-5DF8-4184-8579-722B016BA5B3}" type="datetime1">
               <a:rPr lang="fr-CH" smtClean="0"/>
-              <a:t>14.01.2014</a:t>
+              <a:t>20.01.2014</a:t>
             </a:fld>
             <a:endParaRPr lang="en-US" dirty="0"/>
           </a:p>
@@ -11049,7 +11152,7 @@
           <a:p>
             <a:fld id="{682AD09F-3180-436E-816E-79AE2F329F10}" type="datetime1">
               <a:rPr lang="fr-CH" smtClean="0"/>
-              <a:t>14.01.2014</a:t>
+              <a:t>20.01.2014</a:t>
             </a:fld>
             <a:endParaRPr lang="en-US" dirty="0"/>
           </a:p>
@@ -11217,7 +11320,7 @@
           <a:p>
             <a:fld id="{30B2F984-B698-4924-AE20-D5DA2C47FF2F}" type="datetime1">
               <a:rPr lang="fr-CH" smtClean="0"/>
-              <a:t>14.01.2014</a:t>
+              <a:t>20.01.2014</a:t>
             </a:fld>
             <a:endParaRPr lang="en-US" dirty="0"/>
           </a:p>
@@ -11540,7 +11643,7 @@
   <a:extraClrSchemeLst/>
   <a:extLst>
     <a:ext uri="{05A4C25C-085E-4340-85A3-A5531E510DB2}">
-      <thm15:themeFamily xmlns:thm15="http://schemas.microsoft.com/office/thememl/2012/main" xmlns="" name="Parallax" id="{3388167B-A2EB-4685-9635-1831D9AEF8C4}" vid="{4F7A876A-7598-49CA-AFC8-8EDA2551E4A7}"/>
+      <thm15:themeFamily xmlns="" xmlns:thm15="http://schemas.microsoft.com/office/thememl/2012/main" name="Parallax" id="{3388167B-A2EB-4685-9635-1831D9AEF8C4}" vid="{4F7A876A-7598-49CA-AFC8-8EDA2551E4A7}"/>
     </a:ext>
   </a:extLst>
 </a:theme>
@@ -11801,7 +11904,7 @@
   <a:extraClrSchemeLst/>
   <a:extLst>
     <a:ext uri="{05A4C25C-085E-4340-85A3-A5531E510DB2}">
-      <thm15:themeFamily xmlns:thm15="http://schemas.microsoft.com/office/thememl/2012/main" xmlns="" name="Office Theme" id="{62F939B6-93AF-4DB8-9C6B-D6C7DFDC589F}" vid="{4A3C46E8-61CC-4603-A589-7422A47A8E4A}"/>
+      <thm15:themeFamily xmlns="" xmlns:thm15="http://schemas.microsoft.com/office/thememl/2012/main" name="Office Theme" id="{62F939B6-93AF-4DB8-9C6B-D6C7DFDC589F}" vid="{4A3C46E8-61CC-4603-A589-7422A47A8E4A}"/>
     </a:ext>
   </a:extLst>
 </a:theme>

</xml_diff>